<commit_message>
added PSIP link, removed redundant bullet
</commit_message>
<xml_diff>
--- a/presentations/06-agile-redux.pptx
+++ b/presentations/06-agile-redux.pptx
@@ -293,7 +293,7 @@
               <a:rPr lang="en-US" smtClean="0">
                 <a:uFillTx/>
               </a:rPr>
-              <a:t>8/3/2020</a:t>
+              <a:t>8/7/20</a:t>
             </a:fld>
             <a:endParaRPr lang="en-US" dirty="0">
               <a:uFillTx/>
@@ -478,7 +478,7 @@
               <a:rPr lang="en-US" smtClean="0">
                 <a:uFillTx/>
               </a:rPr>
-              <a:t>8/3/2020</a:t>
+              <a:t>8/7/20</a:t>
             </a:fld>
             <a:endParaRPr lang="en-US" dirty="0">
               <a:uFillTx/>
@@ -9269,7 +9269,7 @@
             </a:br>
             <a:r>
               <a:rPr lang="en-US" sz="2400" dirty="0"/>
-              <a:t>Examples: EXAALT &amp; MPICH – Add PSIP URL</a:t>
+              <a:t>Examples: EXAALT &amp; MPICH</a:t>
             </a:r>
           </a:p>
         </p:txBody>
@@ -9292,7 +9292,7 @@
         </p:nvSpPr>
         <p:spPr>
           <a:xfrm>
-            <a:off x="603550" y="3910425"/>
+            <a:off x="603550" y="3622194"/>
             <a:ext cx="5315677" cy="2391015"/>
           </a:xfrm>
           <a:solidFill>
@@ -9365,7 +9365,7 @@
         </p:blipFill>
         <p:spPr>
           <a:xfrm>
-            <a:off x="1778400" y="4742941"/>
+            <a:off x="1778400" y="4454710"/>
             <a:ext cx="3224728" cy="1558499"/>
           </a:xfrm>
           <a:prstGeom prst="rect">
@@ -9969,7 +9969,7 @@
         </p:blipFill>
         <p:spPr>
           <a:xfrm>
-            <a:off x="603550" y="980834"/>
+            <a:off x="553854" y="694117"/>
             <a:ext cx="5126278" cy="2791616"/>
           </a:xfrm>
           <a:prstGeom prst="rect">
@@ -9977,6 +9977,59 @@
           </a:prstGeom>
         </p:spPr>
       </p:pic>
+      <p:sp>
+        <p:nvSpPr>
+          <p:cNvPr id="8" name="TextBox 7">
+            <a:extLst>
+              <a:ext uri="{FF2B5EF4-FFF2-40B4-BE49-F238E27FC236}">
+                <a16:creationId xmlns:a16="http://schemas.microsoft.com/office/drawing/2014/main" id="{98125C2C-3A9E-AC49-BC3B-D77AB062A323}"/>
+              </a:ext>
+            </a:extLst>
+          </p:cNvPr>
+          <p:cNvSpPr txBox="1"/>
+          <p:nvPr/>
+        </p:nvSpPr>
+        <p:spPr>
+          <a:xfrm>
+            <a:off x="731879" y="6037749"/>
+            <a:ext cx="5059017" cy="840230"/>
+          </a:xfrm>
+          <a:prstGeom prst="rect">
+            <a:avLst/>
+          </a:prstGeom>
+          <a:noFill/>
+        </p:spPr>
+        <p:txBody>
+          <a:bodyPr wrap="square" rtlCol="0">
+            <a:spAutoFit/>
+          </a:bodyPr>
+          <a:lstStyle/>
+          <a:p>
+            <a:pPr algn="ctr">
+              <a:lnSpc>
+                <a:spcPct val="90000"/>
+              </a:lnSpc>
+            </a:pPr>
+            <a:r>
+              <a:rPr lang="en-US" dirty="0">
+                <a:hlinkClick r:id="rId6"/>
+              </a:rPr>
+              <a:t>https://bssw.io/blog_posts/productivity-and-sustainability-improvement-planning-psip</a:t>
+            </a:r>
+            <a:endParaRPr lang="en-US" dirty="0"/>
+          </a:p>
+          <a:p>
+            <a:pPr algn="ctr">
+              <a:lnSpc>
+                <a:spcPct val="90000"/>
+              </a:lnSpc>
+            </a:pPr>
+            <a:endParaRPr lang="en-US" dirty="0">
+              <a:uFillTx/>
+            </a:endParaRPr>
+          </a:p>
+        </p:txBody>
+      </p:sp>
     </p:spTree>
     <p:extLst>
       <p:ext uri="{BB962C8B-B14F-4D97-AF65-F5344CB8AC3E}">

</xml_diff>